<commit_message>
new ignite_ppt with models included
</commit_message>
<xml_diff>
--- a/Ignite_ppt.pptx
+++ b/Ignite_ppt.pptx
@@ -16,6 +16,10 @@
     <p:sldId id="264" r:id="rId10"/>
     <p:sldId id="266" r:id="rId11"/>
     <p:sldId id="265" r:id="rId12"/>
+    <p:sldId id="268" r:id="rId13"/>
+    <p:sldId id="267" r:id="rId14"/>
+    <p:sldId id="269" r:id="rId15"/>
+    <p:sldId id="270" r:id="rId16"/>
   </p:sldIdLst>
   <p:sldSz cx="12192000" cy="6858000"/>
   <p:notesSz cx="6858000" cy="9144000"/>
@@ -3123,7 +3127,25 @@
             </a:r>
           </a:p>
           <a:p>
-            <a:endParaRPr lang="en-US"/>
+            <a:r>
+              <a:rPr lang="en-US" dirty="0"/>
+              <a:t>Another more viable approach: reduce the training list to “10000” rows.</a:t>
+            </a:r>
+          </a:p>
+          <a:p>
+            <a:r>
+              <a:rPr lang="en-US" dirty="0"/>
+              <a:t>These rows are the result of binding head(5000) and tail(5000) of a descending ordered list of original training data.</a:t>
+            </a:r>
+          </a:p>
+          <a:p>
+            <a:r>
+              <a:rPr lang="en-US" dirty="0"/>
+              <a:t>The testing data is then divided into chunks of 10000 rows for applying the trained model.  </a:t>
+            </a:r>
+          </a:p>
+          <a:p>
+            <a:endParaRPr lang="en-US" dirty="0"/>
           </a:p>
         </p:txBody>
       </p:sp>
@@ -3191,7 +3213,9 @@
         </p:nvSpPr>
         <p:spPr/>
         <p:txBody>
-          <a:bodyPr/>
+          <a:bodyPr>
+            <a:normAutofit fontScale="92500" lnSpcReduction="10000"/>
+          </a:bodyPr>
           <a:lstStyle/>
           <a:p>
             <a:r>
@@ -3218,12 +3242,23 @@
             </a:r>
           </a:p>
           <a:p>
-            <a:endParaRPr lang="en-US" dirty="0"/>
+            <a:pPr lvl="1"/>
+            <a:r>
+              <a:rPr lang="en-US" dirty="0"/>
+              <a:t>The chunking as explained earlier is performed on this set</a:t>
+            </a:r>
           </a:p>
           <a:p>
             <a:r>
               <a:rPr lang="en-US" dirty="0"/>
               <a:t>The second set acts as our test set (The rest of the data)</a:t>
+            </a:r>
+          </a:p>
+          <a:p>
+            <a:pPr lvl="1"/>
+            <a:r>
+              <a:rPr lang="en-US" dirty="0"/>
+              <a:t>This is stripped off the response variable and chunked into sets of 10000 rows to run the prediction models on.</a:t>
             </a:r>
           </a:p>
         </p:txBody>
@@ -3232,6 +3267,530 @@
     <p:extLst>
       <p:ext uri="{BB962C8B-B14F-4D97-AF65-F5344CB8AC3E}">
         <p14:creationId xmlns:p14="http://schemas.microsoft.com/office/powerpoint/2010/main" val="3686261091"/>
+      </p:ext>
+    </p:extLst>
+  </p:cSld>
+  <p:clrMapOvr>
+    <a:masterClrMapping/>
+  </p:clrMapOvr>
+</p:sld>
+</file>
+
+<file path=ppt/slides/slide12.xml><?xml version="1.0" encoding="utf-8"?>
+<p:sld xmlns:a="http://schemas.openxmlformats.org/drawingml/2006/main" xmlns:r="http://schemas.openxmlformats.org/officeDocument/2006/relationships" xmlns:p="http://schemas.openxmlformats.org/presentationml/2006/main">
+  <p:cSld>
+    <p:spTree>
+      <p:nvGrpSpPr>
+        <p:cNvPr id="1" name=""/>
+        <p:cNvGrpSpPr/>
+        <p:nvPr/>
+      </p:nvGrpSpPr>
+      <p:grpSpPr>
+        <a:xfrm>
+          <a:off x="0" y="0"/>
+          <a:ext cx="0" cy="0"/>
+          <a:chOff x="0" y="0"/>
+          <a:chExt cx="0" cy="0"/>
+        </a:xfrm>
+      </p:grpSpPr>
+      <p:sp>
+        <p:nvSpPr>
+          <p:cNvPr id="2" name="Title 1"/>
+          <p:cNvSpPr>
+            <a:spLocks noGrp="1"/>
+          </p:cNvSpPr>
+          <p:nvPr>
+            <p:ph type="title"/>
+          </p:nvPr>
+        </p:nvSpPr>
+        <p:spPr/>
+        <p:txBody>
+          <a:bodyPr/>
+          <a:lstStyle/>
+          <a:p>
+            <a:r>
+              <a:rPr lang="en-US" dirty="0"/>
+              <a:t>True Positives</a:t>
+            </a:r>
+          </a:p>
+        </p:txBody>
+      </p:sp>
+      <p:sp>
+        <p:nvSpPr>
+          <p:cNvPr id="3" name="Content Placeholder 2"/>
+          <p:cNvSpPr>
+            <a:spLocks noGrp="1"/>
+          </p:cNvSpPr>
+          <p:nvPr>
+            <p:ph idx="1"/>
+          </p:nvPr>
+        </p:nvSpPr>
+        <p:spPr/>
+        <p:txBody>
+          <a:bodyPr>
+            <a:normAutofit fontScale="92500"/>
+          </a:bodyPr>
+          <a:lstStyle/>
+          <a:p>
+            <a:r>
+              <a:rPr lang="en-US" dirty="0"/>
+              <a:t>Since we don’t have a very efficient way to exactly determine the specific counts, we use a novel idea to improve accuracy of predictions.</a:t>
+            </a:r>
+          </a:p>
+          <a:p>
+            <a:r>
+              <a:rPr lang="en-US" dirty="0"/>
+              <a:t>We define the true positives to be a range of values.</a:t>
+            </a:r>
+          </a:p>
+          <a:p>
+            <a:r>
+              <a:rPr lang="en-US" dirty="0"/>
+              <a:t>Earlier, TP &lt;- result == actual</a:t>
+            </a:r>
+          </a:p>
+          <a:p>
+            <a:r>
+              <a:rPr lang="en-US" dirty="0"/>
+              <a:t>Using the new idea, TP &lt;- (result &gt;= (actual -2)) &amp;&amp; (result &lt;= (actual +2)) </a:t>
+            </a:r>
+          </a:p>
+          <a:p>
+            <a:r>
+              <a:rPr lang="en-US" dirty="0"/>
+              <a:t>This considerably brings up the accuracy</a:t>
+            </a:r>
+          </a:p>
+          <a:p>
+            <a:r>
+              <a:rPr lang="en-US" dirty="0"/>
+              <a:t>It also helps in better estimation of the number of bikes at a given station on a given day at a given time since we estimate more than the actual value.</a:t>
+            </a:r>
+          </a:p>
+        </p:txBody>
+      </p:sp>
+    </p:spTree>
+    <p:extLst>
+      <p:ext uri="{BB962C8B-B14F-4D97-AF65-F5344CB8AC3E}">
+        <p14:creationId xmlns:p14="http://schemas.microsoft.com/office/powerpoint/2010/main" val="1938427879"/>
+      </p:ext>
+    </p:extLst>
+  </p:cSld>
+  <p:clrMapOvr>
+    <a:masterClrMapping/>
+  </p:clrMapOvr>
+</p:sld>
+</file>
+
+<file path=ppt/slides/slide13.xml><?xml version="1.0" encoding="utf-8"?>
+<p:sld xmlns:a="http://schemas.openxmlformats.org/drawingml/2006/main" xmlns:r="http://schemas.openxmlformats.org/officeDocument/2006/relationships" xmlns:p="http://schemas.openxmlformats.org/presentationml/2006/main">
+  <p:cSld>
+    <p:spTree>
+      <p:nvGrpSpPr>
+        <p:cNvPr id="1" name=""/>
+        <p:cNvGrpSpPr/>
+        <p:nvPr/>
+      </p:nvGrpSpPr>
+      <p:grpSpPr>
+        <a:xfrm>
+          <a:off x="0" y="0"/>
+          <a:ext cx="0" cy="0"/>
+          <a:chOff x="0" y="0"/>
+          <a:chExt cx="0" cy="0"/>
+        </a:xfrm>
+      </p:grpSpPr>
+      <p:sp>
+        <p:nvSpPr>
+          <p:cNvPr id="2" name="Title 1"/>
+          <p:cNvSpPr>
+            <a:spLocks noGrp="1"/>
+          </p:cNvSpPr>
+          <p:nvPr>
+            <p:ph type="title"/>
+          </p:nvPr>
+        </p:nvSpPr>
+        <p:spPr/>
+        <p:txBody>
+          <a:bodyPr/>
+          <a:lstStyle/>
+          <a:p>
+            <a:r>
+              <a:rPr lang="en-US" dirty="0"/>
+              <a:t>Models</a:t>
+            </a:r>
+          </a:p>
+        </p:txBody>
+      </p:sp>
+      <p:sp>
+        <p:nvSpPr>
+          <p:cNvPr id="3" name="Content Placeholder 2"/>
+          <p:cNvSpPr>
+            <a:spLocks noGrp="1"/>
+          </p:cNvSpPr>
+          <p:nvPr>
+            <p:ph idx="1"/>
+          </p:nvPr>
+        </p:nvSpPr>
+        <p:spPr/>
+        <p:txBody>
+          <a:bodyPr/>
+          <a:lstStyle/>
+          <a:p>
+            <a:r>
+              <a:rPr lang="en-US" dirty="0"/>
+              <a:t>Linear regression</a:t>
+            </a:r>
+          </a:p>
+          <a:p>
+            <a:pPr lvl="1"/>
+            <a:r>
+              <a:rPr lang="en-US" dirty="0"/>
+              <a:t>This model returns the most basic regression results.</a:t>
+            </a:r>
+          </a:p>
+          <a:p>
+            <a:pPr lvl="1"/>
+            <a:endParaRPr lang="en-US" dirty="0"/>
+          </a:p>
+          <a:p>
+            <a:pPr lvl="1"/>
+            <a:r>
+              <a:rPr lang="en-US" dirty="0"/>
+              <a:t>The variables are all of first order:</a:t>
+            </a:r>
+          </a:p>
+          <a:p>
+            <a:pPr lvl="2"/>
+            <a:r>
+              <a:rPr lang="en-US" dirty="0"/>
+              <a:t>lm(</a:t>
+            </a:r>
+            <a:r>
+              <a:rPr lang="en-US" dirty="0" err="1"/>
+              <a:t>y~StationId+Month+Day+StartHour+StopHour,data</a:t>
+            </a:r>
+            <a:r>
+              <a:rPr lang="en-US" dirty="0"/>
+              <a:t> = training)</a:t>
+            </a:r>
+          </a:p>
+          <a:p>
+            <a:pPr marL="1371600" lvl="3" indent="0">
+              <a:buNone/>
+            </a:pPr>
+            <a:endParaRPr lang="en-US" dirty="0"/>
+          </a:p>
+          <a:p>
+            <a:pPr lvl="1"/>
+            <a:r>
+              <a:rPr lang="en-US" dirty="0"/>
+              <a:t>Based on the True Positives from the previous slide, final predictions give us an accuracy of:</a:t>
+            </a:r>
+          </a:p>
+          <a:p>
+            <a:pPr lvl="2"/>
+            <a:r>
+              <a:rPr lang="en-US" dirty="0"/>
+              <a:t>78.58% 	</a:t>
+            </a:r>
+          </a:p>
+          <a:p>
+            <a:pPr lvl="1"/>
+            <a:r>
+              <a:rPr lang="en-US" dirty="0"/>
+              <a:t>It works as our baseline for prediction</a:t>
+            </a:r>
+          </a:p>
+        </p:txBody>
+      </p:sp>
+    </p:spTree>
+    <p:extLst>
+      <p:ext uri="{BB962C8B-B14F-4D97-AF65-F5344CB8AC3E}">
+        <p14:creationId xmlns:p14="http://schemas.microsoft.com/office/powerpoint/2010/main" val="2110297268"/>
+      </p:ext>
+    </p:extLst>
+  </p:cSld>
+  <p:clrMapOvr>
+    <a:masterClrMapping/>
+  </p:clrMapOvr>
+</p:sld>
+</file>
+
+<file path=ppt/slides/slide14.xml><?xml version="1.0" encoding="utf-8"?>
+<p:sld xmlns:a="http://schemas.openxmlformats.org/drawingml/2006/main" xmlns:r="http://schemas.openxmlformats.org/officeDocument/2006/relationships" xmlns:p="http://schemas.openxmlformats.org/presentationml/2006/main">
+  <p:cSld>
+    <p:spTree>
+      <p:nvGrpSpPr>
+        <p:cNvPr id="1" name=""/>
+        <p:cNvGrpSpPr/>
+        <p:nvPr/>
+      </p:nvGrpSpPr>
+      <p:grpSpPr>
+        <a:xfrm>
+          <a:off x="0" y="0"/>
+          <a:ext cx="0" cy="0"/>
+          <a:chOff x="0" y="0"/>
+          <a:chExt cx="0" cy="0"/>
+        </a:xfrm>
+      </p:grpSpPr>
+      <p:sp>
+        <p:nvSpPr>
+          <p:cNvPr id="2" name="Title 1"/>
+          <p:cNvSpPr>
+            <a:spLocks noGrp="1"/>
+          </p:cNvSpPr>
+          <p:nvPr>
+            <p:ph type="title"/>
+          </p:nvPr>
+        </p:nvSpPr>
+        <p:spPr/>
+        <p:txBody>
+          <a:bodyPr/>
+          <a:lstStyle/>
+          <a:p>
+            <a:r>
+              <a:rPr lang="en-US" dirty="0"/>
+              <a:t>Models (contd..)</a:t>
+            </a:r>
+          </a:p>
+        </p:txBody>
+      </p:sp>
+      <p:sp>
+        <p:nvSpPr>
+          <p:cNvPr id="3" name="Content Placeholder 2"/>
+          <p:cNvSpPr>
+            <a:spLocks noGrp="1"/>
+          </p:cNvSpPr>
+          <p:nvPr>
+            <p:ph idx="1"/>
+          </p:nvPr>
+        </p:nvSpPr>
+        <p:spPr/>
+        <p:txBody>
+          <a:bodyPr>
+            <a:normAutofit lnSpcReduction="10000"/>
+          </a:bodyPr>
+          <a:lstStyle/>
+          <a:p>
+            <a:r>
+              <a:rPr lang="en-US" dirty="0"/>
+              <a:t>Polynomial regression</a:t>
+            </a:r>
+          </a:p>
+          <a:p>
+            <a:pPr lvl="1"/>
+            <a:r>
+              <a:rPr lang="en-US" dirty="0"/>
+              <a:t>This model provides a slightly lower performing fit in data with 2</a:t>
+            </a:r>
+            <a:r>
+              <a:rPr lang="en-US" baseline="30000" dirty="0"/>
+              <a:t>nd</a:t>
+            </a:r>
+            <a:r>
+              <a:rPr lang="en-US" dirty="0"/>
+              <a:t> order variables in addition to what we had in the linear regression model.</a:t>
+            </a:r>
+          </a:p>
+          <a:p>
+            <a:pPr lvl="1"/>
+            <a:endParaRPr lang="en-US" dirty="0"/>
+          </a:p>
+          <a:p>
+            <a:pPr lvl="1"/>
+            <a:r>
+              <a:rPr lang="en-US" dirty="0"/>
+              <a:t>The variables are of first as well as second order:</a:t>
+            </a:r>
+          </a:p>
+          <a:p>
+            <a:pPr lvl="2"/>
+            <a:r>
+              <a:rPr lang="en-US" dirty="0"/>
+              <a:t>lm(</a:t>
+            </a:r>
+            <a:r>
+              <a:rPr lang="en-US" dirty="0" err="1"/>
+              <a:t>y~StationId+Month+Day+StartHour+StopHour+I</a:t>
+            </a:r>
+            <a:r>
+              <a:rPr lang="en-US" dirty="0"/>
+              <a:t>(Month^2)+I(Day^2)+I(StartHour^2)+I(StopHour^2),data = training)</a:t>
+            </a:r>
+          </a:p>
+          <a:p>
+            <a:pPr lvl="1"/>
+            <a:r>
+              <a:rPr lang="en-US" dirty="0"/>
+              <a:t>Based on the True Positives from the previous slide, final predictions give us an accuracy of:</a:t>
+            </a:r>
+          </a:p>
+          <a:p>
+            <a:pPr lvl="2"/>
+            <a:r>
+              <a:rPr lang="en-US" dirty="0"/>
+              <a:t>73.08%	</a:t>
+            </a:r>
+          </a:p>
+          <a:p>
+            <a:pPr lvl="1"/>
+            <a:r>
+              <a:rPr lang="en-US" dirty="0"/>
+              <a:t>This gives us a decrease in accuracy of 5.5% as compared to our linear baseline.</a:t>
+            </a:r>
+          </a:p>
+          <a:p>
+            <a:endParaRPr lang="en-US" dirty="0"/>
+          </a:p>
+        </p:txBody>
+      </p:sp>
+    </p:spTree>
+    <p:extLst>
+      <p:ext uri="{BB962C8B-B14F-4D97-AF65-F5344CB8AC3E}">
+        <p14:creationId xmlns:p14="http://schemas.microsoft.com/office/powerpoint/2010/main" val="4264113592"/>
+      </p:ext>
+    </p:extLst>
+  </p:cSld>
+  <p:clrMapOvr>
+    <a:masterClrMapping/>
+  </p:clrMapOvr>
+</p:sld>
+</file>
+
+<file path=ppt/slides/slide15.xml><?xml version="1.0" encoding="utf-8"?>
+<p:sld xmlns:a="http://schemas.openxmlformats.org/drawingml/2006/main" xmlns:r="http://schemas.openxmlformats.org/officeDocument/2006/relationships" xmlns:p="http://schemas.openxmlformats.org/presentationml/2006/main">
+  <p:cSld>
+    <p:spTree>
+      <p:nvGrpSpPr>
+        <p:cNvPr id="1" name=""/>
+        <p:cNvGrpSpPr/>
+        <p:nvPr/>
+      </p:nvGrpSpPr>
+      <p:grpSpPr>
+        <a:xfrm>
+          <a:off x="0" y="0"/>
+          <a:ext cx="0" cy="0"/>
+          <a:chOff x="0" y="0"/>
+          <a:chExt cx="0" cy="0"/>
+        </a:xfrm>
+      </p:grpSpPr>
+      <p:sp>
+        <p:nvSpPr>
+          <p:cNvPr id="2" name="Title 1"/>
+          <p:cNvSpPr>
+            <a:spLocks noGrp="1"/>
+          </p:cNvSpPr>
+          <p:nvPr>
+            <p:ph type="title"/>
+          </p:nvPr>
+        </p:nvSpPr>
+        <p:spPr/>
+        <p:txBody>
+          <a:bodyPr/>
+          <a:lstStyle/>
+          <a:p>
+            <a:r>
+              <a:rPr lang="en-US" dirty="0"/>
+              <a:t>Models (contd..)</a:t>
+            </a:r>
+          </a:p>
+        </p:txBody>
+      </p:sp>
+      <p:sp>
+        <p:nvSpPr>
+          <p:cNvPr id="3" name="Content Placeholder 2"/>
+          <p:cNvSpPr>
+            <a:spLocks noGrp="1"/>
+          </p:cNvSpPr>
+          <p:nvPr>
+            <p:ph idx="1"/>
+          </p:nvPr>
+        </p:nvSpPr>
+        <p:spPr/>
+        <p:txBody>
+          <a:bodyPr/>
+          <a:lstStyle/>
+          <a:p>
+            <a:r>
+              <a:rPr lang="en-US" dirty="0"/>
+              <a:t>Polynomial regression</a:t>
+            </a:r>
+          </a:p>
+          <a:p>
+            <a:pPr lvl="1"/>
+            <a:r>
+              <a:rPr lang="en-US" dirty="0"/>
+              <a:t>This model’s performance decreases drastically as compared to the other two models.</a:t>
+            </a:r>
+          </a:p>
+          <a:p>
+            <a:pPr lvl="1"/>
+            <a:r>
+              <a:rPr lang="en-US" dirty="0"/>
+              <a:t>The variables are </a:t>
+            </a:r>
+            <a:r>
+              <a:rPr lang="en-US" dirty="0" err="1"/>
+              <a:t>upto</a:t>
+            </a:r>
+            <a:r>
+              <a:rPr lang="en-US" dirty="0"/>
+              <a:t> the 3</a:t>
+            </a:r>
+            <a:r>
+              <a:rPr lang="en-US" baseline="30000" dirty="0"/>
+              <a:t>rd</a:t>
+            </a:r>
+            <a:r>
+              <a:rPr lang="en-US" dirty="0"/>
+              <a:t> order:</a:t>
+            </a:r>
+          </a:p>
+          <a:p>
+            <a:pPr lvl="2"/>
+            <a:r>
+              <a:rPr lang="en-US" dirty="0"/>
+              <a:t>lm(</a:t>
+            </a:r>
+            <a:r>
+              <a:rPr lang="en-US" dirty="0" err="1"/>
+              <a:t>y~StationId+Month+Day+StartHour+StopHour+I</a:t>
+            </a:r>
+            <a:r>
+              <a:rPr lang="en-US" dirty="0"/>
+              <a:t>(Month^2)+I(Day^2)+I(StartHour^2)+I(StopHour^2)+I(Month^3)+I(Day^3)+I(StartHour^3)+I(StopHour^3),data = training)</a:t>
+            </a:r>
+          </a:p>
+          <a:p>
+            <a:pPr lvl="1"/>
+            <a:r>
+              <a:rPr lang="en-US" dirty="0"/>
+              <a:t>Based on the True Positives from the previous slide, final predictions give us an accuracy of:</a:t>
+            </a:r>
+          </a:p>
+          <a:p>
+            <a:pPr lvl="2"/>
+            <a:r>
+              <a:rPr lang="en-US" dirty="0"/>
+              <a:t>42.03%	</a:t>
+            </a:r>
+          </a:p>
+          <a:p>
+            <a:pPr lvl="1"/>
+            <a:r>
+              <a:rPr lang="en-US" dirty="0"/>
+              <a:t>This drastic drop in accuracy renders further use of nonlinear models unusable.</a:t>
+            </a:r>
+          </a:p>
+          <a:p>
+            <a:endParaRPr lang="en-US" dirty="0"/>
+          </a:p>
+        </p:txBody>
+      </p:sp>
+    </p:spTree>
+    <p:extLst>
+      <p:ext uri="{BB962C8B-B14F-4D97-AF65-F5344CB8AC3E}">
+        <p14:creationId xmlns:p14="http://schemas.microsoft.com/office/powerpoint/2010/main" val="3469986035"/>
       </p:ext>
     </p:extLst>
   </p:cSld>

</xml_diff>